<commit_message>
opravene chyby, final verzia
</commit_message>
<xml_diff>
--- a/Vplyv umelej inteligencie na sach - Cederle Marek.pptx
+++ b/Vplyv umelej inteligencie na sach - Cederle Marek.pptx
@@ -10127,94 +10127,25 @@
           <a:p>
             <a:r>
               <a:rPr lang="sk-SK" dirty="0"/>
-              <a:t>Bol to zápas medzi vtedajším majstrom sveta </a:t>
-            </a:r>
-            <a:r>
-              <a:rPr lang="sk-SK" dirty="0" err="1"/>
-              <a:t>Garrym</a:t>
-            </a:r>
+              <a:t>Bol to zápas medzi vtedajším majstrom sveta Garrym Kasparovom a počítačom Deep Blue od spoločnosti IBM</a:t>
+            </a:r>
+          </a:p>
+          <a:p>
             <a:r>
               <a:rPr lang="sk-SK" dirty="0"/>
-              <a:t> </a:t>
-            </a:r>
-            <a:r>
-              <a:rPr lang="sk-SK" dirty="0" err="1"/>
-              <a:t>Kasparovom</a:t>
-            </a:r>
+              <a:t>Počítač využíval hrubú silu (brute force) tým že za ním nebola priveľká logika, snažil sa iba vypočítať všetky možné ťahy a prehľadával milióny pozícií</a:t>
+            </a:r>
+          </a:p>
+          <a:p>
             <a:r>
               <a:rPr lang="sk-SK" dirty="0"/>
-              <a:t> a počítačom </a:t>
-            </a:r>
-            <a:r>
-              <a:rPr lang="sk-SK" dirty="0" err="1"/>
-              <a:t>Deep</a:t>
-            </a:r>
+              <a:t>Od vtedy sa výkon superpočítačov posunul tak, že žiadny človek nemá šancu poraziť jeden z najlepších šachových enginov AlphaZero</a:t>
+            </a:r>
+          </a:p>
+          <a:p>
             <a:r>
               <a:rPr lang="sk-SK" dirty="0"/>
-              <a:t> </a:t>
-            </a:r>
-            <a:r>
-              <a:rPr lang="sk-SK" dirty="0" err="1"/>
-              <a:t>Blue</a:t>
-            </a:r>
-            <a:r>
-              <a:rPr lang="sk-SK" dirty="0"/>
-              <a:t> od spoločnosti IBM</a:t>
-            </a:r>
-          </a:p>
-          <a:p>
-            <a:r>
-              <a:rPr lang="sk-SK" dirty="0"/>
-              <a:t>Počítač využíval hrubú silu (</a:t>
-            </a:r>
-            <a:r>
-              <a:rPr lang="sk-SK" dirty="0" err="1"/>
-              <a:t>brute</a:t>
-            </a:r>
-            <a:r>
-              <a:rPr lang="sk-SK" dirty="0"/>
-              <a:t> </a:t>
-            </a:r>
-            <a:r>
-              <a:rPr lang="sk-SK" dirty="0" err="1"/>
-              <a:t>force</a:t>
-            </a:r>
-            <a:r>
-              <a:rPr lang="sk-SK" dirty="0"/>
-              <a:t>) tým že za ním nebola priveľká logika, snažil sa iba vypočítať všetky možné ťahy a prehľadával milióny pozícií</a:t>
-            </a:r>
-          </a:p>
-          <a:p>
-            <a:r>
-              <a:rPr lang="sk-SK" dirty="0"/>
-              <a:t>Od vtedy sa výkon superpočítačov posunul tak, že žiadny človek nemá šancu poraziť jeden z najlepších šachových </a:t>
-            </a:r>
-            <a:r>
-              <a:rPr lang="sk-SK" dirty="0" err="1"/>
-              <a:t>enginov</a:t>
-            </a:r>
-            <a:r>
-              <a:rPr lang="sk-SK" dirty="0"/>
-              <a:t> </a:t>
-            </a:r>
-            <a:r>
-              <a:rPr lang="sk-SK" dirty="0" err="1"/>
-              <a:t>AlphaZero</a:t>
-            </a:r>
-            <a:endParaRPr lang="sk-SK" dirty="0"/>
-          </a:p>
-          <a:p>
-            <a:r>
-              <a:rPr lang="sk-SK" dirty="0"/>
-              <a:t>V dnešnej dobe sami hráči študujú partie tohto </a:t>
-            </a:r>
-            <a:r>
-              <a:rPr lang="sk-SK" dirty="0" err="1"/>
-              <a:t>enginu</a:t>
-            </a:r>
-            <a:r>
-              <a:rPr lang="sk-SK" dirty="0"/>
-              <a:t> aby mohli vymyslieť nové stratégie</a:t>
+              <a:t>V dnešnej dobe sami hráči študujú partie tohto enginu aby mohli vymyslieť nové stratégie</a:t>
             </a:r>
           </a:p>
         </p:txBody>
@@ -10312,13 +10243,8 @@
           <a:p>
             <a:r>
               <a:rPr lang="sk-SK" dirty="0"/>
-              <a:t>Napríklad stránka Chess.com používa svoju obrovskú databázu a porovnáva pravdepodobnosť hráča urobiť najlepší možný ťah podľa daného </a:t>
-            </a:r>
-            <a:r>
-              <a:rPr lang="sk-SK" dirty="0" err="1"/>
-              <a:t>enginu</a:t>
-            </a:r>
-            <a:endParaRPr lang="sk-SK" dirty="0"/>
+              <a:t>Napríklad stránka Chess.com používa svoju obrovskú databázu a porovnáva pravdepodobnosť hráča urobiť najlepší možný ťah podľa daného enginu</a:t>
+            </a:r>
           </a:p>
         </p:txBody>
       </p:sp>

</xml_diff>